<commit_message>
Minor updates Yeah... I edited master. Don't @ me
</commit_message>
<xml_diff>
--- a/Why your red team should not be special/RedTeamSpecial.pptx
+++ b/Why your red team should not be special/RedTeamSpecial.pptx
@@ -7943,8 +7943,8 @@
         <a:lstStyle/>
         <a:p>
           <a:r>
-            <a:rPr lang="en-US"/>
-            <a:t>Internal APT</a:t>
+            <a:rPr lang="en-US" dirty="0"/>
+            <a:t>Internal Adversary Simulations (APT)</a:t>
           </a:r>
         </a:p>
       </dgm:t>
@@ -9233,10 +9233,9 @@
         <a:lstStyle/>
         <a:p>
           <a:r>
-            <a:rPr lang="en-US"/>
-            <a:t>Internal APT</a:t>
+            <a:rPr lang="en-US" dirty="0"/>
+            <a:t>Internal Adversary Simulations (APT)</a:t>
           </a:r>
-          <a:endParaRPr lang="en-US" dirty="0"/>
         </a:p>
       </dgm:t>
     </dgm:pt>
@@ -10277,7 +10276,7 @@
         <a:p>
           <a:r>
             <a:rPr lang="en-US" dirty="0"/>
-            <a:t>Internal APT</a:t>
+            <a:t>Internal Adversary Simulations (APT)</a:t>
           </a:r>
         </a:p>
       </dgm:t>
@@ -13197,8 +13196,8 @@
             <a:buNone/>
           </a:pPr>
           <a:r>
-            <a:rPr lang="en-US" sz="1700" kern="1200"/>
-            <a:t>Internal APT</a:t>
+            <a:rPr lang="en-US" sz="1700" kern="1200" dirty="0"/>
+            <a:t>Internal Adversary Simulations (APT)</a:t>
           </a:r>
         </a:p>
       </dsp:txBody>
@@ -13914,10 +13913,9 @@
             <a:buNone/>
           </a:pPr>
           <a:r>
-            <a:rPr lang="en-US" sz="1300" kern="1200"/>
-            <a:t>Internal APT</a:t>
+            <a:rPr lang="en-US" sz="1300" kern="1200" dirty="0"/>
+            <a:t>Internal Adversary Simulations (APT)</a:t>
           </a:r>
-          <a:endParaRPr lang="en-US" sz="1300" kern="1200" dirty="0"/>
         </a:p>
       </dsp:txBody>
       <dsp:txXfrm>
@@ -16130,7 +16128,7 @@
           </a:pPr>
           <a:r>
             <a:rPr lang="en-US" sz="1300" kern="1200" dirty="0"/>
-            <a:t>Internal APT</a:t>
+            <a:t>Internal Adversary Simulations (APT)</a:t>
           </a:r>
         </a:p>
       </dsp:txBody>
@@ -28570,7 +28568,7 @@
           <a:p>
             <a:fld id="{3B862FB3-2386-AA43-8DEE-F113786B2F21}" type="datetimeFigureOut">
               <a:rPr lang="en-US" smtClean="0"/>
-              <a:t>3/28/19</a:t>
+              <a:t>5/18/19</a:t>
             </a:fld>
             <a:endParaRPr lang="en-US"/>
           </a:p>
@@ -31339,7 +31337,7 @@
           <a:p>
             <a:fld id="{1245F9DB-C900-AA48-81C4-0DE8BDC7E12E}" type="datetime1">
               <a:rPr lang="en-US" smtClean="0"/>
-              <a:t>3/28/19</a:t>
+              <a:t>5/18/19</a:t>
             </a:fld>
             <a:endParaRPr lang="en-US"/>
           </a:p>
@@ -31512,7 +31510,7 @@
           <a:p>
             <a:fld id="{89DB6884-9580-7F4A-A3AB-2ACE5ED512FC}" type="datetime1">
               <a:rPr lang="en-US" smtClean="0"/>
-              <a:t>3/28/19</a:t>
+              <a:t>5/18/19</a:t>
             </a:fld>
             <a:endParaRPr lang="en-US"/>
           </a:p>
@@ -31695,7 +31693,7 @@
           <a:p>
             <a:fld id="{56B28365-52D2-354A-B120-2C84F9A26641}" type="datetime1">
               <a:rPr lang="en-US" smtClean="0"/>
-              <a:t>3/28/19</a:t>
+              <a:t>5/18/19</a:t>
             </a:fld>
             <a:endParaRPr lang="en-US"/>
           </a:p>
@@ -31868,7 +31866,7 @@
           <a:p>
             <a:fld id="{6C17A014-1995-7741-B399-B4E66AB5CDA2}" type="datetime1">
               <a:rPr lang="en-US" smtClean="0"/>
-              <a:t>3/28/19</a:t>
+              <a:t>5/18/19</a:t>
             </a:fld>
             <a:endParaRPr lang="en-US"/>
           </a:p>
@@ -32129,7 +32127,7 @@
           <a:p>
             <a:fld id="{0223B0D0-ECF6-FA46-856D-48FAD7E40F81}" type="datetime1">
               <a:rPr lang="en-US" smtClean="0"/>
-              <a:t>3/28/19</a:t>
+              <a:t>5/18/19</a:t>
             </a:fld>
             <a:endParaRPr lang="en-US"/>
           </a:p>
@@ -32420,7 +32418,7 @@
           <a:p>
             <a:fld id="{43EB842C-E060-E348-9B88-7B12ACE53754}" type="datetime1">
               <a:rPr lang="en-US" smtClean="0"/>
-              <a:t>3/28/19</a:t>
+              <a:t>5/18/19</a:t>
             </a:fld>
             <a:endParaRPr lang="en-US"/>
           </a:p>
@@ -32865,7 +32863,7 @@
           <a:p>
             <a:fld id="{C526501B-C35C-9B4D-B9F2-DFDFADB562BD}" type="datetime1">
               <a:rPr lang="en-US" smtClean="0"/>
-              <a:t>3/28/19</a:t>
+              <a:t>5/18/19</a:t>
             </a:fld>
             <a:endParaRPr lang="en-US"/>
           </a:p>
@@ -32986,7 +32984,7 @@
           <a:p>
             <a:fld id="{017E0B76-BBA0-8E48-A7B1-56C33D260D30}" type="datetime1">
               <a:rPr lang="en-US" smtClean="0"/>
-              <a:t>3/28/19</a:t>
+              <a:t>5/18/19</a:t>
             </a:fld>
             <a:endParaRPr lang="en-US"/>
           </a:p>
@@ -33084,7 +33082,7 @@
           <a:p>
             <a:fld id="{809DAC28-AC33-E740-A35E-053E2DD9E5D8}" type="datetime1">
               <a:rPr lang="en-US" smtClean="0"/>
-              <a:t>3/28/19</a:t>
+              <a:t>5/18/19</a:t>
             </a:fld>
             <a:endParaRPr lang="en-US"/>
           </a:p>
@@ -33375,7 +33373,7 @@
           <a:p>
             <a:fld id="{B34DE10C-2EDA-4246-AA86-E76DFD667EE6}" type="datetime1">
               <a:rPr lang="en-US" smtClean="0"/>
-              <a:t>3/28/19</a:t>
+              <a:t>5/18/19</a:t>
             </a:fld>
             <a:endParaRPr lang="en-US"/>
           </a:p>
@@ -33651,7 +33649,7 @@
           <a:p>
             <a:fld id="{555D1A64-A6F1-964F-9507-1196D3348034}" type="datetime1">
               <a:rPr lang="en-US" smtClean="0"/>
-              <a:t>3/28/19</a:t>
+              <a:t>5/18/19</a:t>
             </a:fld>
             <a:endParaRPr lang="en-US"/>
           </a:p>
@@ -33951,7 +33949,7 @@
           <a:p>
             <a:fld id="{CA3E84E5-5047-C44C-A0A7-5BC0A4F563B2}" type="datetime1">
               <a:rPr lang="en-US" smtClean="0"/>
-              <a:t>3/28/19</a:t>
+              <a:t>5/18/19</a:t>
             </a:fld>
             <a:endParaRPr lang="en-US"/>
           </a:p>
@@ -35293,7 +35291,7 @@
             <p:ph idx="1"/>
             <p:extLst>
               <p:ext uri="{D42A27DB-BD31-4B8C-83A1-F6EECF244321}">
-                <p14:modId xmlns:p14="http://schemas.microsoft.com/office/powerpoint/2010/main" val="1186265500"/>
+                <p14:modId xmlns:p14="http://schemas.microsoft.com/office/powerpoint/2010/main" val="3890847802"/>
               </p:ext>
             </p:extLst>
           </p:nvPr>
@@ -35712,7 +35710,7 @@
           <p:nvPr>
             <p:extLst>
               <p:ext uri="{D42A27DB-BD31-4B8C-83A1-F6EECF244321}">
-                <p14:modId xmlns:p14="http://schemas.microsoft.com/office/powerpoint/2010/main" val="4140814038"/>
+                <p14:modId xmlns:p14="http://schemas.microsoft.com/office/powerpoint/2010/main" val="1121119972"/>
               </p:ext>
             </p:extLst>
           </p:nvPr>
@@ -35934,7 +35932,7 @@
           <p:nvPr>
             <p:extLst>
               <p:ext uri="{D42A27DB-BD31-4B8C-83A1-F6EECF244321}">
-                <p14:modId xmlns:p14="http://schemas.microsoft.com/office/powerpoint/2010/main" val="1414822630"/>
+                <p14:modId xmlns:p14="http://schemas.microsoft.com/office/powerpoint/2010/main" val="2471030543"/>
               </p:ext>
             </p:extLst>
           </p:nvPr>
@@ -36354,6 +36352,12 @@
             <a:r>
               <a:rPr lang="en-US" dirty="0"/>
               <a:t>Red teams can lead by example and build positive relationships</a:t>
+            </a:r>
+          </a:p>
+          <a:p>
+            <a:r>
+              <a:rPr lang="en-US" dirty="0"/>
+              <a:t>Future Research: “Map” RTMM to ATT&amp;CK</a:t>
             </a:r>
           </a:p>
         </p:txBody>
@@ -37276,7 +37280,7 @@
           <a:p>
             <a:r>
               <a:rPr lang="en-US" dirty="0"/>
-              <a:t>Naught AWS Activity</a:t>
+              <a:t>Naughty AWS Activity</a:t>
             </a:r>
           </a:p>
           <a:p>

</xml_diff>